<commit_message>
Final Commit - Minor Changes
</commit_message>
<xml_diff>
--- a/Project PPt.pptx
+++ b/Project PPt.pptx
@@ -585,7 +585,7 @@
           <a:p>
             <a:fld id="{EA0C0817-A112-4847-8014-A94B7D2A4EA3}" type="datetime1">
               <a:rPr lang="en-US" smtClean="0"/>
-              <a:t>1/29/2021</a:t>
+              <a:t>4/11/2021</a:t>
             </a:fld>
             <a:endParaRPr lang="en-US" dirty="0"/>
           </a:p>
@@ -787,7 +787,7 @@
           <a:p>
             <a:fld id="{134F40B7-36AB-4376-BE14-EF7004D79BB9}" type="datetime1">
               <a:rPr lang="en-US" smtClean="0"/>
-              <a:t>1/29/2021</a:t>
+              <a:t>4/11/2021</a:t>
             </a:fld>
             <a:endParaRPr lang="en-US"/>
           </a:p>
@@ -967,7 +967,7 @@
           <a:p>
             <a:fld id="{FF87CAB8-DCAE-46A5-AADA-B3FAD11A54E0}" type="datetime1">
               <a:rPr lang="en-US" smtClean="0"/>
-              <a:t>1/29/2021</a:t>
+              <a:t>4/11/2021</a:t>
             </a:fld>
             <a:endParaRPr lang="en-US"/>
           </a:p>
@@ -1137,7 +1137,7 @@
           <a:p>
             <a:fld id="{7332B432-ACDA-4023-A761-2BAB76577B62}" type="datetime1">
               <a:rPr lang="en-US" smtClean="0"/>
-              <a:t>1/29/2021</a:t>
+              <a:t>4/11/2021</a:t>
             </a:fld>
             <a:endParaRPr lang="en-US"/>
           </a:p>
@@ -1736,7 +1736,7 @@
           <a:p>
             <a:fld id="{D9C646AA-F36E-4540-911D-FFFC0A0EF24A}" type="datetime1">
               <a:rPr lang="en-US" smtClean="0"/>
-              <a:t>1/29/2021</a:t>
+              <a:t>4/11/2021</a:t>
             </a:fld>
             <a:endParaRPr lang="en-US" dirty="0"/>
           </a:p>
@@ -2056,7 +2056,7 @@
           <a:p>
             <a:fld id="{69186D26-FA5F-4637-B602-B7C2DC34CFD4}" type="datetime1">
               <a:rPr lang="en-US" smtClean="0"/>
-              <a:t>1/29/2021</a:t>
+              <a:t>4/11/2021</a:t>
             </a:fld>
             <a:endParaRPr lang="en-US"/>
           </a:p>
@@ -2491,7 +2491,7 @@
           <a:p>
             <a:fld id="{8A7F15D8-96D1-4781-BC50-CA8A088B2FE4}" type="datetime1">
               <a:rPr lang="en-US" smtClean="0"/>
-              <a:t>1/29/2021</a:t>
+              <a:t>4/11/2021</a:t>
             </a:fld>
             <a:endParaRPr lang="en-US"/>
           </a:p>
@@ -2609,7 +2609,7 @@
           <a:p>
             <a:fld id="{F9A96C99-B8F8-4528-BD05-0E16E943DC09}" type="datetime1">
               <a:rPr lang="en-US" smtClean="0"/>
-              <a:t>1/29/2021</a:t>
+              <a:t>4/11/2021</a:t>
             </a:fld>
             <a:endParaRPr lang="en-US"/>
           </a:p>
@@ -2704,7 +2704,7 @@
           <a:p>
             <a:fld id="{03636942-C211-4B28-8DBD-C953E00AF71B}" type="datetime1">
               <a:rPr lang="en-US" smtClean="0"/>
-              <a:t>1/29/2021</a:t>
+              <a:t>4/11/2021</a:t>
             </a:fld>
             <a:endParaRPr lang="en-US"/>
           </a:p>
@@ -3121,7 +3121,7 @@
           <a:p>
             <a:fld id="{7E8D12A6-918A-48BD-8CB9-CA713993B0EA}" type="datetime1">
               <a:rPr lang="en-US" smtClean="0"/>
-              <a:t>1/29/2021</a:t>
+              <a:t>4/11/2021</a:t>
             </a:fld>
             <a:endParaRPr lang="en-US"/>
           </a:p>
@@ -3383,7 +3383,7 @@
             <a:fld id="{E778CE86-875F-4587-BCF6-FA054AFC0D53}" type="datetime1">
               <a:rPr lang="en-US" smtClean="0"/>
               <a:pPr/>
-              <a:t>1/29/2021</a:t>
+              <a:t>4/11/2021</a:t>
             </a:fld>
             <a:endParaRPr lang="en-US" dirty="0"/>
           </a:p>
@@ -3899,7 +3899,7 @@
           <a:p>
             <a:fld id="{F6FA2B21-3FCD-4721-B95C-427943F61125}" type="datetime1">
               <a:rPr lang="en-US" smtClean="0"/>
-              <a:t>1/29/2021</a:t>
+              <a:t>4/11/2021</a:t>
             </a:fld>
             <a:endParaRPr lang="en-US"/>
           </a:p>
@@ -5374,19 +5374,36 @@
               <a:buAutoNum type="arabicPeriod"/>
             </a:pPr>
             <a:r>
+              <a:rPr lang="en-IN" dirty="0"/>
+              <a:t>LZW Encoding (Uses dictionaries)	[Couldn’t implement this </a:t>
+            </a:r>
+            <a:r>
+              <a:rPr lang="en-IN" dirty="0">
+                <a:sym typeface="Wingdings" panose="05000000000000000000" pitchFamily="2" charset="2"/>
+              </a:rPr>
+              <a:t></a:t>
+            </a:r>
+            <a:r>
+              <a:rPr lang="en-IN" dirty="0"/>
+              <a:t>]</a:t>
+            </a:r>
+          </a:p>
+          <a:p>
+            <a:r>
+              <a:rPr lang="en-IN" dirty="0"/>
+              <a:t>Program will be able to compress/decompress files, if user wants can give password while compression for security		[</a:t>
+            </a:r>
+            <a:r>
               <a:rPr lang="en-IN"/>
-              <a:t>LZW Encoding (Uses dictionaries)</a:t>
-            </a:r>
-          </a:p>
-          <a:p>
-            <a:r>
-              <a:rPr lang="en-IN"/>
-              <a:t>Program </a:t>
-            </a:r>
-            <a:r>
-              <a:rPr lang="en-IN" dirty="0"/>
-              <a:t>will be able to compress/decompress files, if user wants can give password while compression for security</a:t>
-            </a:r>
+              <a:t>Or this </a:t>
+            </a:r>
+            <a:r>
+              <a:rPr lang="en-IN">
+                <a:sym typeface="Wingdings" panose="05000000000000000000" pitchFamily="2" charset="2"/>
+              </a:rPr>
+              <a:t>]</a:t>
+            </a:r>
+            <a:endParaRPr lang="en-IN" dirty="0"/>
           </a:p>
           <a:p>
             <a:r>

</xml_diff>

<commit_message>
ppt and code flow added
</commit_message>
<xml_diff>
--- a/Project PPt.pptx
+++ b/Project PPt.pptx
@@ -10,6 +10,7 @@
     <p:sldId id="258" r:id="rId4"/>
     <p:sldId id="259" r:id="rId5"/>
     <p:sldId id="260" r:id="rId6"/>
+    <p:sldId id="261" r:id="rId7"/>
   </p:sldIdLst>
   <p:sldSz cx="12192000" cy="6858000"/>
   <p:notesSz cx="6858000" cy="9144000"/>
@@ -585,7 +586,7 @@
           <a:p>
             <a:fld id="{EA0C0817-A112-4847-8014-A94B7D2A4EA3}" type="datetime1">
               <a:rPr lang="en-US" smtClean="0"/>
-              <a:t>4/11/2021</a:t>
+              <a:t>4/17/2021</a:t>
             </a:fld>
             <a:endParaRPr lang="en-US" dirty="0"/>
           </a:p>
@@ -787,7 +788,7 @@
           <a:p>
             <a:fld id="{134F40B7-36AB-4376-BE14-EF7004D79BB9}" type="datetime1">
               <a:rPr lang="en-US" smtClean="0"/>
-              <a:t>4/11/2021</a:t>
+              <a:t>4/17/2021</a:t>
             </a:fld>
             <a:endParaRPr lang="en-US"/>
           </a:p>
@@ -967,7 +968,7 @@
           <a:p>
             <a:fld id="{FF87CAB8-DCAE-46A5-AADA-B3FAD11A54E0}" type="datetime1">
               <a:rPr lang="en-US" smtClean="0"/>
-              <a:t>4/11/2021</a:t>
+              <a:t>4/17/2021</a:t>
             </a:fld>
             <a:endParaRPr lang="en-US"/>
           </a:p>
@@ -1137,7 +1138,7 @@
           <a:p>
             <a:fld id="{7332B432-ACDA-4023-A761-2BAB76577B62}" type="datetime1">
               <a:rPr lang="en-US" smtClean="0"/>
-              <a:t>4/11/2021</a:t>
+              <a:t>4/17/2021</a:t>
             </a:fld>
             <a:endParaRPr lang="en-US"/>
           </a:p>
@@ -1736,7 +1737,7 @@
           <a:p>
             <a:fld id="{D9C646AA-F36E-4540-911D-FFFC0A0EF24A}" type="datetime1">
               <a:rPr lang="en-US" smtClean="0"/>
-              <a:t>4/11/2021</a:t>
+              <a:t>4/17/2021</a:t>
             </a:fld>
             <a:endParaRPr lang="en-US" dirty="0"/>
           </a:p>
@@ -2056,7 +2057,7 @@
           <a:p>
             <a:fld id="{69186D26-FA5F-4637-B602-B7C2DC34CFD4}" type="datetime1">
               <a:rPr lang="en-US" smtClean="0"/>
-              <a:t>4/11/2021</a:t>
+              <a:t>4/17/2021</a:t>
             </a:fld>
             <a:endParaRPr lang="en-US"/>
           </a:p>
@@ -2491,7 +2492,7 @@
           <a:p>
             <a:fld id="{8A7F15D8-96D1-4781-BC50-CA8A088B2FE4}" type="datetime1">
               <a:rPr lang="en-US" smtClean="0"/>
-              <a:t>4/11/2021</a:t>
+              <a:t>4/17/2021</a:t>
             </a:fld>
             <a:endParaRPr lang="en-US"/>
           </a:p>
@@ -2609,7 +2610,7 @@
           <a:p>
             <a:fld id="{F9A96C99-B8F8-4528-BD05-0E16E943DC09}" type="datetime1">
               <a:rPr lang="en-US" smtClean="0"/>
-              <a:t>4/11/2021</a:t>
+              <a:t>4/17/2021</a:t>
             </a:fld>
             <a:endParaRPr lang="en-US"/>
           </a:p>
@@ -2704,7 +2705,7 @@
           <a:p>
             <a:fld id="{03636942-C211-4B28-8DBD-C953E00AF71B}" type="datetime1">
               <a:rPr lang="en-US" smtClean="0"/>
-              <a:t>4/11/2021</a:t>
+              <a:t>4/17/2021</a:t>
             </a:fld>
             <a:endParaRPr lang="en-US"/>
           </a:p>
@@ -3121,7 +3122,7 @@
           <a:p>
             <a:fld id="{7E8D12A6-918A-48BD-8CB9-CA713993B0EA}" type="datetime1">
               <a:rPr lang="en-US" smtClean="0"/>
-              <a:t>4/11/2021</a:t>
+              <a:t>4/17/2021</a:t>
             </a:fld>
             <a:endParaRPr lang="en-US"/>
           </a:p>
@@ -3383,7 +3384,7 @@
             <a:fld id="{E778CE86-875F-4587-BCF6-FA054AFC0D53}" type="datetime1">
               <a:rPr lang="en-US" smtClean="0"/>
               <a:pPr/>
-              <a:t>4/11/2021</a:t>
+              <a:t>4/17/2021</a:t>
             </a:fld>
             <a:endParaRPr lang="en-US" dirty="0"/>
           </a:p>
@@ -3899,7 +3900,7 @@
           <a:p>
             <a:fld id="{F6FA2B21-3FCD-4721-B95C-427943F61125}" type="datetime1">
               <a:rPr lang="en-US" smtClean="0"/>
-              <a:t>4/11/2021</a:t>
+              <a:t>4/17/2021</a:t>
             </a:fld>
             <a:endParaRPr lang="en-US"/>
           </a:p>
@@ -5426,6 +5427,69 @@
 </p:sld>
 </file>
 
+<file path=ppt/slides/slide6.xml><?xml version="1.0" encoding="utf-8"?>
+<p:sld xmlns:a="http://schemas.openxmlformats.org/drawingml/2006/main" xmlns:r="http://schemas.openxmlformats.org/officeDocument/2006/relationships" xmlns:p="http://schemas.openxmlformats.org/presentationml/2006/main">
+  <p:cSld>
+    <p:spTree>
+      <p:nvGrpSpPr>
+        <p:cNvPr id="1" name=""/>
+        <p:cNvGrpSpPr/>
+        <p:nvPr/>
+      </p:nvGrpSpPr>
+      <p:grpSpPr>
+        <a:xfrm>
+          <a:off x="0" y="0"/>
+          <a:ext cx="0" cy="0"/>
+          <a:chOff x="0" y="0"/>
+          <a:chExt cx="0" cy="0"/>
+        </a:xfrm>
+      </p:grpSpPr>
+      <p:sp>
+        <p:nvSpPr>
+          <p:cNvPr id="2" name="Title 1">
+            <a:extLst>
+              <a:ext uri="{FF2B5EF4-FFF2-40B4-BE49-F238E27FC236}">
+                <a16:creationId xmlns:a16="http://schemas.microsoft.com/office/drawing/2014/main" id="{BD71EBB7-3E8C-4B2F-9F2F-63585F91FEBC}"/>
+              </a:ext>
+            </a:extLst>
+          </p:cNvPr>
+          <p:cNvSpPr>
+            <a:spLocks noGrp="1"/>
+          </p:cNvSpPr>
+          <p:nvPr>
+            <p:ph type="title"/>
+          </p:nvPr>
+        </p:nvSpPr>
+        <p:spPr>
+          <a:xfrm>
+            <a:off x="1066800" y="2743200"/>
+            <a:ext cx="10058400" cy="1371600"/>
+          </a:xfrm>
+        </p:spPr>
+        <p:txBody>
+          <a:bodyPr/>
+          <a:lstStyle/>
+          <a:p>
+            <a:r>
+              <a:rPr lang="en-IN" dirty="0"/>
+              <a:t>Move to show flow of code and explaining actual code and execution</a:t>
+            </a:r>
+          </a:p>
+        </p:txBody>
+      </p:sp>
+    </p:spTree>
+    <p:extLst>
+      <p:ext uri="{BB962C8B-B14F-4D97-AF65-F5344CB8AC3E}">
+        <p14:creationId xmlns:p14="http://schemas.microsoft.com/office/powerpoint/2010/main" val="403136407"/>
+      </p:ext>
+    </p:extLst>
+  </p:cSld>
+  <p:clrMapOvr>
+    <a:masterClrMapping/>
+  </p:clrMapOvr>
+</p:sld>
+</file>
+
 <file path=ppt/theme/theme1.xml><?xml version="1.0" encoding="utf-8"?>
 <a:theme xmlns:a="http://schemas.openxmlformats.org/drawingml/2006/main" name="SavonVTI">
   <a:themeElements>

</xml_diff>